<commit_message>
More Samuel L Jackson
</commit_message>
<xml_diff>
--- a/Press Button, Get Development Environment.pptx
+++ b/Press Button, Get Development Environment.pptx
@@ -203,7 +203,7 @@
           <a:p>
             <a:fld id="{94D9A9AC-593C-4C0C-8E79-4C4E284D9A19}" type="datetimeFigureOut">
               <a:rPr lang="en-US" smtClean="0"/>
-              <a:t>10/25/2022</a:t>
+              <a:t>1/30/2023</a:t>
             </a:fld>
             <a:endParaRPr lang="en-US"/>
           </a:p>
@@ -775,7 +775,7 @@
           <a:p>
             <a:fld id="{A1644ED5-DBC8-49E8-8D6E-1C3C2E667529}" type="datetimeFigureOut">
               <a:rPr lang="en-US" smtClean="0"/>
-              <a:t>10/25/2022</a:t>
+              <a:t>1/30/2023</a:t>
             </a:fld>
             <a:endParaRPr lang="en-US"/>
           </a:p>
@@ -973,7 +973,7 @@
           <a:p>
             <a:fld id="{A1644ED5-DBC8-49E8-8D6E-1C3C2E667529}" type="datetimeFigureOut">
               <a:rPr lang="en-US" smtClean="0"/>
-              <a:t>10/25/2022</a:t>
+              <a:t>1/30/2023</a:t>
             </a:fld>
             <a:endParaRPr lang="en-US"/>
           </a:p>
@@ -1181,7 +1181,7 @@
           <a:p>
             <a:fld id="{A1644ED5-DBC8-49E8-8D6E-1C3C2E667529}" type="datetimeFigureOut">
               <a:rPr lang="en-US" smtClean="0"/>
-              <a:t>10/25/2022</a:t>
+              <a:t>1/30/2023</a:t>
             </a:fld>
             <a:endParaRPr lang="en-US"/>
           </a:p>
@@ -1379,7 +1379,7 @@
           <a:p>
             <a:fld id="{A1644ED5-DBC8-49E8-8D6E-1C3C2E667529}" type="datetimeFigureOut">
               <a:rPr lang="en-US" smtClean="0"/>
-              <a:t>10/25/2022</a:t>
+              <a:t>1/30/2023</a:t>
             </a:fld>
             <a:endParaRPr lang="en-US"/>
           </a:p>
@@ -1654,7 +1654,7 @@
           <a:p>
             <a:fld id="{A1644ED5-DBC8-49E8-8D6E-1C3C2E667529}" type="datetimeFigureOut">
               <a:rPr lang="en-US" smtClean="0"/>
-              <a:t>10/25/2022</a:t>
+              <a:t>1/30/2023</a:t>
             </a:fld>
             <a:endParaRPr lang="en-US"/>
           </a:p>
@@ -1919,7 +1919,7 @@
           <a:p>
             <a:fld id="{A1644ED5-DBC8-49E8-8D6E-1C3C2E667529}" type="datetimeFigureOut">
               <a:rPr lang="en-US" smtClean="0"/>
-              <a:t>10/25/2022</a:t>
+              <a:t>1/30/2023</a:t>
             </a:fld>
             <a:endParaRPr lang="en-US"/>
           </a:p>
@@ -2331,7 +2331,7 @@
           <a:p>
             <a:fld id="{A1644ED5-DBC8-49E8-8D6E-1C3C2E667529}" type="datetimeFigureOut">
               <a:rPr lang="en-US" smtClean="0"/>
-              <a:t>10/25/2022</a:t>
+              <a:t>1/30/2023</a:t>
             </a:fld>
             <a:endParaRPr lang="en-US"/>
           </a:p>
@@ -2472,7 +2472,7 @@
           <a:p>
             <a:fld id="{A1644ED5-DBC8-49E8-8D6E-1C3C2E667529}" type="datetimeFigureOut">
               <a:rPr lang="en-US" smtClean="0"/>
-              <a:t>10/25/2022</a:t>
+              <a:t>1/30/2023</a:t>
             </a:fld>
             <a:endParaRPr lang="en-US"/>
           </a:p>
@@ -2585,7 +2585,7 @@
           <a:p>
             <a:fld id="{A1644ED5-DBC8-49E8-8D6E-1C3C2E667529}" type="datetimeFigureOut">
               <a:rPr lang="en-US" smtClean="0"/>
-              <a:t>10/25/2022</a:t>
+              <a:t>1/30/2023</a:t>
             </a:fld>
             <a:endParaRPr lang="en-US"/>
           </a:p>
@@ -2896,7 +2896,7 @@
           <a:p>
             <a:fld id="{A1644ED5-DBC8-49E8-8D6E-1C3C2E667529}" type="datetimeFigureOut">
               <a:rPr lang="en-US" smtClean="0"/>
-              <a:t>10/25/2022</a:t>
+              <a:t>1/30/2023</a:t>
             </a:fld>
             <a:endParaRPr lang="en-US"/>
           </a:p>
@@ -3184,7 +3184,7 @@
           <a:p>
             <a:fld id="{A1644ED5-DBC8-49E8-8D6E-1C3C2E667529}" type="datetimeFigureOut">
               <a:rPr lang="en-US" smtClean="0"/>
-              <a:t>10/25/2022</a:t>
+              <a:t>1/30/2023</a:t>
             </a:fld>
             <a:endParaRPr lang="en-US"/>
           </a:p>
@@ -3425,7 +3425,7 @@
           <a:p>
             <a:fld id="{A1644ED5-DBC8-49E8-8D6E-1C3C2E667529}" type="datetimeFigureOut">
               <a:rPr lang="en-US" smtClean="0"/>
-              <a:t>10/25/2022</a:t>
+              <a:t>1/30/2023</a:t>
             </a:fld>
             <a:endParaRPr lang="en-US"/>
           </a:p>
@@ -4435,6 +4435,53 @@
           </a:p>
         </p:txBody>
       </p:sp>
+      <p:pic>
+        <p:nvPicPr>
+          <p:cNvPr id="1026" name="Picture 2" descr="say it works on my machine one more time - Samuel L Jackson - Meme Generator">
+            <a:extLst>
+              <a:ext uri="{FF2B5EF4-FFF2-40B4-BE49-F238E27FC236}">
+                <a16:creationId xmlns:a16="http://schemas.microsoft.com/office/drawing/2014/main" id="{88D4A94F-56B3-2895-A803-92D4559022A8}"/>
+              </a:ext>
+            </a:extLst>
+          </p:cNvPr>
+          <p:cNvPicPr>
+            <a:picLocks noChangeAspect="1" noChangeArrowheads="1"/>
+          </p:cNvPicPr>
+          <p:nvPr/>
+        </p:nvPicPr>
+        <p:blipFill>
+          <a:blip r:embed="rId3">
+            <a:extLst>
+              <a:ext uri="{28A0092B-C50C-407E-A947-70E740481C1C}">
+                <a14:useLocalDpi xmlns:a14="http://schemas.microsoft.com/office/drawing/2010/main" val="0"/>
+              </a:ext>
+            </a:extLst>
+          </a:blip>
+          <a:srcRect/>
+          <a:stretch>
+            <a:fillRect/>
+          </a:stretch>
+        </p:blipFill>
+        <p:spPr bwMode="auto">
+          <a:xfrm>
+            <a:off x="2589855" y="1500739"/>
+            <a:ext cx="7239000" cy="5095875"/>
+          </a:xfrm>
+          <a:prstGeom prst="rect">
+            <a:avLst/>
+          </a:prstGeom>
+          <a:noFill/>
+          <a:extLst>
+            <a:ext uri="{909E8E84-426E-40DD-AFC4-6F175D3DCCD1}">
+              <a14:hiddenFill xmlns:a14="http://schemas.microsoft.com/office/drawing/2010/main">
+                <a:solidFill>
+                  <a:srgbClr val="FFFFFF"/>
+                </a:solidFill>
+              </a14:hiddenFill>
+            </a:ext>
+          </a:extLst>
+        </p:spPr>
+      </p:pic>
     </p:spTree>
     <p:extLst>
       <p:ext uri="{BB962C8B-B14F-4D97-AF65-F5344CB8AC3E}">
@@ -4445,6 +4492,89 @@
   <p:clrMapOvr>
     <a:masterClrMapping/>
   </p:clrMapOvr>
+  <p:timing>
+    <p:tnLst>
+      <p:par>
+        <p:cTn id="1" dur="indefinite" restart="never" nodeType="tmRoot">
+          <p:childTnLst>
+            <p:seq concurrent="1" nextAc="seek">
+              <p:cTn id="2" dur="indefinite" nodeType="mainSeq">
+                <p:childTnLst>
+                  <p:par>
+                    <p:cTn id="3" fill="hold">
+                      <p:stCondLst>
+                        <p:cond delay="indefinite"/>
+                      </p:stCondLst>
+                      <p:childTnLst>
+                        <p:par>
+                          <p:cTn id="4" fill="hold">
+                            <p:stCondLst>
+                              <p:cond delay="0"/>
+                            </p:stCondLst>
+                            <p:childTnLst>
+                              <p:par>
+                                <p:cTn id="5" presetID="10" presetClass="entr" presetSubtype="0" fill="hold" nodeType="clickEffect">
+                                  <p:stCondLst>
+                                    <p:cond delay="0"/>
+                                  </p:stCondLst>
+                                  <p:childTnLst>
+                                    <p:set>
+                                      <p:cBhvr>
+                                        <p:cTn id="6" dur="1" fill="hold">
+                                          <p:stCondLst>
+                                            <p:cond delay="0"/>
+                                          </p:stCondLst>
+                                        </p:cTn>
+                                        <p:tgtEl>
+                                          <p:spTgt spid="1026"/>
+                                        </p:tgtEl>
+                                        <p:attrNameLst>
+                                          <p:attrName>style.visibility</p:attrName>
+                                        </p:attrNameLst>
+                                      </p:cBhvr>
+                                      <p:to>
+                                        <p:strVal val="visible"/>
+                                      </p:to>
+                                    </p:set>
+                                    <p:animEffect transition="in" filter="fade">
+                                      <p:cBhvr>
+                                        <p:cTn id="7" dur="500"/>
+                                        <p:tgtEl>
+                                          <p:spTgt spid="1026"/>
+                                        </p:tgtEl>
+                                      </p:cBhvr>
+                                    </p:animEffect>
+                                  </p:childTnLst>
+                                </p:cTn>
+                              </p:par>
+                            </p:childTnLst>
+                          </p:cTn>
+                        </p:par>
+                      </p:childTnLst>
+                    </p:cTn>
+                  </p:par>
+                </p:childTnLst>
+              </p:cTn>
+              <p:prevCondLst>
+                <p:cond evt="onPrev" delay="0">
+                  <p:tgtEl>
+                    <p:sldTgt/>
+                  </p:tgtEl>
+                </p:cond>
+              </p:prevCondLst>
+              <p:nextCondLst>
+                <p:cond evt="onNext" delay="0">
+                  <p:tgtEl>
+                    <p:sldTgt/>
+                  </p:tgtEl>
+                </p:cond>
+              </p:nextCondLst>
+            </p:seq>
+          </p:childTnLst>
+        </p:cTn>
+      </p:par>
+    </p:tnLst>
+  </p:timing>
 </p:sld>
 </file>
 

</xml_diff>